<commit_message>
add separate Re files, start 23 cal unc
</commit_message>
<xml_diff>
--- a/Ne-like W LineIDs.pptx
+++ b/Ne-like W LineIDs.pptx
@@ -4649,8 +4649,12 @@
           <a:lstStyle/>
           <a:p>
             <a:r>
-              <a:rPr lang="en-US"/>
-              <a:t>Check Beiersdorfer</a:t>
+              <a:rPr lang="en-US" dirty="0"/>
+              <a:t>Check </a:t>
+            </a:r>
+            <a:r>
+              <a:rPr lang="en-US" dirty="0" err="1"/>
+              <a:t>Beiersdorfer</a:t>
             </a:r>
             <a:r>
               <a:rPr lang="en-US" dirty="0"/>

</xml_diff>